<commit_message>
Add online versions and fix css link
</commit_message>
<xml_diff>
--- a/docs/team_demo.pptx
+++ b/docs/team_demo.pptx
@@ -5845,7 +5845,7 @@
           <p:nvPr>
             <p:extLst>
               <p:ext uri="{D42A27DB-BD31-4B8C-83A1-F6EECF244321}">
-                <p14:modId xmlns:p14="http://schemas.microsoft.com/office/powerpoint/2010/main" val="2607094835"/>
+                <p14:modId xmlns:p14="http://schemas.microsoft.com/office/powerpoint/2010/main" val="450882287"/>
               </p:ext>
             </p:extLst>
           </p:nvPr>
@@ -5939,7 +5939,13 @@
                     <a:p>
                       <a:r>
                         <a:rPr lang="en-US" b="1" dirty="0"/>
-                        <a:t>Description of Issues</a:t>
+                        <a:t>Issues</a:t>
+                      </a:r>
+                    </a:p>
+                    <a:p>
+                      <a:r>
+                        <a:rPr lang="en-US" b="0" dirty="0"/>
+                        <a:t>(If Partial or Not Started)</a:t>
                       </a:r>
                     </a:p>
                   </a:txBody>
@@ -6353,79 +6359,115 @@
       </p:sp>
       <p:graphicFrame>
         <p:nvGraphicFramePr>
-          <p:cNvPr id="55" name="Google Shape;55;p13"/>
-          <p:cNvGraphicFramePr/>
+          <p:cNvPr id="2" name="Table 1">
+            <a:extLst>
+              <a:ext uri="{FF2B5EF4-FFF2-40B4-BE49-F238E27FC236}">
+                <a16:creationId xmlns:a16="http://schemas.microsoft.com/office/drawing/2014/main" id="{4EFF72B4-F1AD-9FDE-477D-17C8FF722937}"/>
+              </a:ext>
+            </a:extLst>
+          </p:cNvPr>
+          <p:cNvGraphicFramePr>
+            <a:graphicFrameLocks noGrp="1"/>
+          </p:cNvGraphicFramePr>
           <p:nvPr>
             <p:extLst>
               <p:ext uri="{D42A27DB-BD31-4B8C-83A1-F6EECF244321}">
-                <p14:modId xmlns:p14="http://schemas.microsoft.com/office/powerpoint/2010/main" val="108814331"/>
+                <p14:modId xmlns:p14="http://schemas.microsoft.com/office/powerpoint/2010/main" val="2666054369"/>
               </p:ext>
             </p:extLst>
           </p:nvPr>
         </p:nvGraphicFramePr>
         <p:xfrm>
-          <a:off x="453482" y="1249375"/>
-          <a:ext cx="8162694" cy="3291780"/>
+          <a:off x="490653" y="1280968"/>
+          <a:ext cx="8162694" cy="3053394"/>
         </p:xfrm>
         <a:graphic>
           <a:graphicData uri="http://schemas.openxmlformats.org/drawingml/2006/table">
             <a:tbl>
-              <a:tblPr>
-                <a:noFill/>
+              <a:tblPr firstRow="1" bandRow="1">
                 <a:tableStyleId>{3EACB621-0D06-4155-B42C-C01728FB47A3}</a:tableStyleId>
               </a:tblPr>
               <a:tblGrid>
-                <a:gridCol w="4081347">
+                <a:gridCol w="2720898">
                   <a:extLst>
                     <a:ext uri="{9D8B030D-6E8A-4147-A177-3AD203B41FA5}">
-                      <a16:colId xmlns:a16="http://schemas.microsoft.com/office/drawing/2014/main" val="20000"/>
+                      <a16:colId xmlns:a16="http://schemas.microsoft.com/office/drawing/2014/main" val="2386366385"/>
                     </a:ext>
                   </a:extLst>
                 </a:gridCol>
-                <a:gridCol w="4081347">
+                <a:gridCol w="2720898">
                   <a:extLst>
                     <a:ext uri="{9D8B030D-6E8A-4147-A177-3AD203B41FA5}">
-                      <a16:colId xmlns:a16="http://schemas.microsoft.com/office/drawing/2014/main" val="20001"/>
+                      <a16:colId xmlns:a16="http://schemas.microsoft.com/office/drawing/2014/main" val="3825684231"/>
+                    </a:ext>
+                  </a:extLst>
+                </a:gridCol>
+                <a:gridCol w="2720898">
+                  <a:extLst>
+                    <a:ext uri="{9D8B030D-6E8A-4147-A177-3AD203B41FA5}">
+                      <a16:colId xmlns:a16="http://schemas.microsoft.com/office/drawing/2014/main" val="1448141761"/>
                     </a:ext>
                   </a:extLst>
                 </a:gridCol>
               </a:tblGrid>
-              <a:tr h="381000">
+              <a:tr h="430068">
                 <a:tc>
                   <a:txBody>
                     <a:bodyPr/>
                     <a:lstStyle/>
                     <a:p>
-                      <a:pPr marL="0" lvl="0" indent="0" algn="l" rtl="0">
-                        <a:spcBef>
-                          <a:spcPts val="0"/>
-                        </a:spcBef>
-                        <a:spcAft>
-                          <a:spcPts val="0"/>
-                        </a:spcAft>
-                        <a:buNone/>
-                      </a:pPr>
+                      <a:pPr algn="ctr"/>
                       <a:r>
-                        <a:rPr lang="en-US" sz="1200" b="1" u="sng" dirty="0">
-                          <a:solidFill>
-                            <a:schemeClr val="dk1"/>
-                          </a:solidFill>
-                        </a:rPr>
-                        <a:t>What Went Well?</a:t>
+                        <a:rPr lang="en-US" b="1"/>
+                        <a:t>What the team </a:t>
+                      </a:r>
+                      <a:r>
+                        <a:rPr lang="en-US" b="1" dirty="0"/>
+                        <a:t>Learned?</a:t>
                       </a:r>
                     </a:p>
+                  </a:txBody>
+                  <a:tcPr anchor="ctr"/>
+                </a:tc>
+                <a:tc>
+                  <a:txBody>
+                    <a:bodyPr/>
+                    <a:lstStyle/>
                     <a:p>
-                      <a:pPr marL="0" lvl="0" indent="0" algn="l" rtl="0">
-                        <a:spcBef>
-                          <a:spcPts val="0"/>
-                        </a:spcBef>
-                        <a:spcAft>
-                          <a:spcPts val="0"/>
-                        </a:spcAft>
-                        <a:buNone/>
-                      </a:pPr>
-                      <a:endParaRPr lang="en-US" sz="1200" dirty="0"/>
+                      <a:pPr algn="ctr"/>
+                      <a:r>
+                        <a:rPr lang="en-US" b="1" dirty="0"/>
+                        <a:t>What can be Improved?</a:t>
+                      </a:r>
                     </a:p>
+                  </a:txBody>
+                  <a:tcPr anchor="ctr"/>
+                </a:tc>
+                <a:tc>
+                  <a:txBody>
+                    <a:bodyPr/>
+                    <a:lstStyle/>
+                    <a:p>
+                      <a:pPr algn="ctr"/>
+                      <a:r>
+                        <a:rPr lang="en-US" b="1" dirty="0"/>
+                        <a:t>Future Plans for this Project?</a:t>
+                      </a:r>
+                    </a:p>
+                  </a:txBody>
+                  <a:tcPr anchor="ctr"/>
+                </a:tc>
+                <a:extLst>
+                  <a:ext uri="{0D108BD9-81ED-4DB2-BD59-A6C34878D82A}">
+                    <a16:rowId xmlns:a16="http://schemas.microsoft.com/office/drawing/2014/main" val="18073963"/>
+                  </a:ext>
+                </a:extLst>
+              </a:tr>
+              <a:tr h="2623326">
+                <a:tc>
+                  <a:txBody>
+                    <a:bodyPr/>
+                    <a:lstStyle/>
                     <a:p>
                       <a:pPr marL="457200" lvl="0" indent="-317500" algn="l" rtl="0">
                         <a:spcBef>
@@ -6434,250 +6476,20 @@
                         <a:spcAft>
                           <a:spcPts val="0"/>
                         </a:spcAft>
+                        <a:buClr>
+                          <a:schemeClr val="dk1"/>
+                        </a:buClr>
                         <a:buSzPts val="1400"/>
                         <a:buChar char="●"/>
                       </a:pPr>
                       <a:r>
-                        <a:rPr lang="pt-BR" sz="1200" dirty="0"/>
-                        <a:t>Item 1</a:t>
-                      </a:r>
-                    </a:p>
-                    <a:p>
-                      <a:pPr marL="457200" lvl="0" indent="-317500" algn="l" rtl="0">
-                        <a:spcBef>
-                          <a:spcPts val="0"/>
-                        </a:spcBef>
-                        <a:spcAft>
-                          <a:spcPts val="0"/>
-                        </a:spcAft>
-                        <a:buSzPts val="1400"/>
-                        <a:buChar char="●"/>
-                      </a:pPr>
-                      <a:r>
-                        <a:rPr lang="pt-BR" sz="1200" dirty="0"/>
-                        <a:t>Item 2</a:t>
-                      </a:r>
-                    </a:p>
-                    <a:p>
-                      <a:pPr marL="457200" lvl="0" indent="-317500" algn="l" rtl="0">
-                        <a:spcBef>
-                          <a:spcPts val="0"/>
-                        </a:spcBef>
-                        <a:spcAft>
-                          <a:spcPts val="0"/>
-                        </a:spcAft>
-                        <a:buSzPts val="1400"/>
-                        <a:buChar char="●"/>
-                      </a:pPr>
-                      <a:r>
-                        <a:rPr lang="pt-BR" sz="1200" dirty="0"/>
-                        <a:t>Item 3</a:t>
-                      </a:r>
-                    </a:p>
-                    <a:p>
-                      <a:pPr marL="457200" lvl="0" indent="-317500" algn="l" rtl="0">
-                        <a:spcBef>
-                          <a:spcPts val="0"/>
-                        </a:spcBef>
-                        <a:spcAft>
-                          <a:spcPts val="0"/>
-                        </a:spcAft>
-                        <a:buSzPts val="1400"/>
-                        <a:buChar char="●"/>
-                      </a:pPr>
-                      <a:r>
-                        <a:rPr lang="pt-BR" sz="1200" dirty="0"/>
-                        <a:t>Item 4</a:t>
-                      </a:r>
-                    </a:p>
-                    <a:p>
-                      <a:pPr marL="457200" lvl="0" indent="-317500" algn="l" rtl="0">
-                        <a:spcBef>
-                          <a:spcPts val="0"/>
-                        </a:spcBef>
-                        <a:spcAft>
-                          <a:spcPts val="0"/>
-                        </a:spcAft>
-                        <a:buSzPts val="1400"/>
-                        <a:buChar char="●"/>
-                      </a:pPr>
-                      <a:r>
-                        <a:rPr lang="pt-BR" sz="1200" dirty="0"/>
-                        <a:t>…</a:t>
-                      </a:r>
-                    </a:p>
-                  </a:txBody>
-                  <a:tcPr marL="91425" marR="91425" marT="91425" marB="91425"/>
-                </a:tc>
-                <a:tc>
-                  <a:txBody>
-                    <a:bodyPr/>
-                    <a:lstStyle/>
-                    <a:p>
-                      <a:pPr marL="0" lvl="0" indent="0" algn="l" rtl="0">
-                        <a:spcBef>
-                          <a:spcPts val="0"/>
-                        </a:spcBef>
-                        <a:spcAft>
-                          <a:spcPts val="0"/>
-                        </a:spcAft>
-                        <a:buNone/>
-                      </a:pPr>
-                      <a:r>
-                        <a:rPr lang="en-US" sz="1200" b="1" u="sng" dirty="0"/>
-                        <a:t>What can be improved?</a:t>
-                      </a:r>
-                    </a:p>
-                    <a:p>
-                      <a:pPr marL="0" lvl="0" indent="0" algn="l" rtl="0">
-                        <a:spcBef>
-                          <a:spcPts val="0"/>
-                        </a:spcBef>
-                        <a:spcAft>
-                          <a:spcPts val="0"/>
-                        </a:spcAft>
-                        <a:buNone/>
-                      </a:pPr>
-                      <a:endParaRPr sz="1200" b="1" u="sng" dirty="0"/>
-                    </a:p>
-                    <a:p>
-                      <a:pPr marL="457200" lvl="0" indent="-317500" algn="l" rtl="0">
-                        <a:spcBef>
-                          <a:spcPts val="0"/>
-                        </a:spcBef>
-                        <a:spcAft>
-                          <a:spcPts val="0"/>
-                        </a:spcAft>
-                        <a:buSzPts val="1400"/>
-                        <a:buChar char="●"/>
-                      </a:pPr>
-                      <a:r>
-                        <a:rPr lang="en" sz="1200" dirty="0"/>
-                        <a:t>Item 1</a:t>
-                      </a:r>
-                      <a:endParaRPr sz="1200" dirty="0"/>
-                    </a:p>
-                    <a:p>
-                      <a:pPr marL="457200" lvl="0" indent="-317500" algn="l" rtl="0">
-                        <a:spcBef>
-                          <a:spcPts val="0"/>
-                        </a:spcBef>
-                        <a:spcAft>
-                          <a:spcPts val="0"/>
-                        </a:spcAft>
-                        <a:buSzPts val="1400"/>
-                        <a:buChar char="●"/>
-                      </a:pPr>
-                      <a:r>
-                        <a:rPr lang="en" sz="1200" dirty="0"/>
-                        <a:t>Item 2</a:t>
-                      </a:r>
-                      <a:endParaRPr sz="1200" dirty="0"/>
-                    </a:p>
-                    <a:p>
-                      <a:pPr marL="457200" lvl="0" indent="-317500" algn="l" rtl="0">
-                        <a:spcBef>
-                          <a:spcPts val="0"/>
-                        </a:spcBef>
-                        <a:spcAft>
-                          <a:spcPts val="0"/>
-                        </a:spcAft>
-                        <a:buSzPts val="1400"/>
-                        <a:buChar char="●"/>
-                      </a:pPr>
-                      <a:r>
-                        <a:rPr lang="en" sz="1200" dirty="0"/>
-                        <a:t>Item 3</a:t>
-                      </a:r>
-                      <a:endParaRPr sz="1200" dirty="0"/>
-                    </a:p>
-                    <a:p>
-                      <a:pPr marL="457200" lvl="0" indent="-317500" algn="l" rtl="0">
-                        <a:spcBef>
-                          <a:spcPts val="0"/>
-                        </a:spcBef>
-                        <a:spcAft>
-                          <a:spcPts val="0"/>
-                        </a:spcAft>
-                        <a:buSzPts val="1400"/>
-                        <a:buChar char="●"/>
-                      </a:pPr>
-                      <a:r>
-                        <a:rPr lang="en" sz="1200" dirty="0"/>
-                        <a:t>Item 4</a:t>
-                      </a:r>
-                      <a:endParaRPr sz="1200" dirty="0"/>
-                    </a:p>
-                    <a:p>
-                      <a:pPr marL="457200" lvl="0" indent="-317500" algn="l" rtl="0">
-                        <a:spcBef>
-                          <a:spcPts val="0"/>
-                        </a:spcBef>
-                        <a:spcAft>
-                          <a:spcPts val="0"/>
-                        </a:spcAft>
-                        <a:buSzPts val="1400"/>
-                        <a:buChar char="●"/>
-                      </a:pPr>
-                      <a:r>
-                        <a:rPr lang="en" sz="1200" dirty="0"/>
-                        <a:t>…</a:t>
-                      </a:r>
-                      <a:endParaRPr sz="1200" dirty="0"/>
-                    </a:p>
-                  </a:txBody>
-                  <a:tcPr marL="91425" marR="91425" marT="91425" marB="91425"/>
-                </a:tc>
-                <a:extLst>
-                  <a:ext uri="{0D108BD9-81ED-4DB2-BD59-A6C34878D82A}">
-                    <a16:rowId xmlns:a16="http://schemas.microsoft.com/office/drawing/2014/main" val="10000"/>
-                  </a:ext>
-                </a:extLst>
-              </a:tr>
-              <a:tr h="381000">
-                <a:tc>
-                  <a:txBody>
-                    <a:bodyPr/>
-                    <a:lstStyle/>
-                    <a:p>
-                      <a:pPr marL="0" lvl="0" indent="0" algn="l" rtl="0">
-                        <a:spcBef>
-                          <a:spcPts val="0"/>
-                        </a:spcBef>
-                        <a:spcAft>
-                          <a:spcPts val="0"/>
-                        </a:spcAft>
-                        <a:buNone/>
-                      </a:pPr>
-                      <a:r>
-                        <a:rPr lang="en-US" sz="1200" b="1" u="sng" dirty="0">
+                        <a:rPr lang="pt-BR" sz="1200" dirty="0">
                           <a:solidFill>
                             <a:schemeClr val="dk1"/>
                           </a:solidFill>
                         </a:rPr>
-                        <a:t>Future Plans for this Project</a:t>
+                        <a:t>Item 1</a:t>
                       </a:r>
-                      <a:endParaRPr sz="1200" b="1" u="sng" dirty="0">
-                        <a:solidFill>
-                          <a:schemeClr val="dk1"/>
-                        </a:solidFill>
-                      </a:endParaRPr>
-                    </a:p>
-                    <a:p>
-                      <a:pPr marL="0" lvl="0" indent="0" algn="l" rtl="0">
-                        <a:spcBef>
-                          <a:spcPts val="0"/>
-                        </a:spcBef>
-                        <a:spcAft>
-                          <a:spcPts val="0"/>
-                        </a:spcAft>
-                        <a:buNone/>
-                      </a:pPr>
-                      <a:endParaRPr sz="1200" u="sng" dirty="0">
-                        <a:solidFill>
-                          <a:schemeClr val="dk1"/>
-                        </a:solidFill>
-                      </a:endParaRPr>
                     </a:p>
                     <a:p>
                       <a:pPr marL="457200" lvl="0" indent="-317500" algn="l" rtl="0">
@@ -6694,18 +6506,13 @@
                         <a:buChar char="●"/>
                       </a:pPr>
                       <a:r>
-                        <a:rPr lang="en" sz="1200" dirty="0">
+                        <a:rPr lang="pt-BR" sz="1200" dirty="0">
                           <a:solidFill>
                             <a:schemeClr val="dk1"/>
                           </a:solidFill>
                         </a:rPr>
-                        <a:t>Item 1</a:t>
+                        <a:t>Item 2</a:t>
                       </a:r>
-                      <a:endParaRPr sz="1200" dirty="0">
-                        <a:solidFill>
-                          <a:schemeClr val="dk1"/>
-                        </a:solidFill>
-                      </a:endParaRPr>
                     </a:p>
                     <a:p>
                       <a:pPr marL="457200" lvl="0" indent="-317500" algn="l" rtl="0">
@@ -6722,18 +6529,13 @@
                         <a:buChar char="●"/>
                       </a:pPr>
                       <a:r>
-                        <a:rPr lang="en" sz="1200" dirty="0">
+                        <a:rPr lang="pt-BR" sz="1200" dirty="0">
                           <a:solidFill>
                             <a:schemeClr val="dk1"/>
                           </a:solidFill>
                         </a:rPr>
-                        <a:t>Item 2</a:t>
+                        <a:t>Item 3</a:t>
                       </a:r>
-                      <a:endParaRPr sz="1200" dirty="0">
-                        <a:solidFill>
-                          <a:schemeClr val="dk1"/>
-                        </a:solidFill>
-                      </a:endParaRPr>
                     </a:p>
                     <a:p>
                       <a:pPr marL="457200" lvl="0" indent="-317500" algn="l" rtl="0">
@@ -6750,18 +6552,13 @@
                         <a:buChar char="●"/>
                       </a:pPr>
                       <a:r>
-                        <a:rPr lang="en" sz="1200" dirty="0">
+                        <a:rPr lang="pt-BR" sz="1200" dirty="0">
                           <a:solidFill>
                             <a:schemeClr val="dk1"/>
                           </a:solidFill>
                         </a:rPr>
-                        <a:t>Item 3</a:t>
+                        <a:t>Item 4</a:t>
                       </a:r>
-                      <a:endParaRPr sz="1200" dirty="0">
-                        <a:solidFill>
-                          <a:schemeClr val="dk1"/>
-                        </a:solidFill>
-                      </a:endParaRPr>
                     </a:p>
                     <a:p>
                       <a:pPr marL="457200" lvl="0" indent="-317500" algn="l" rtl="0">
@@ -6778,18 +6575,46 @@
                         <a:buChar char="●"/>
                       </a:pPr>
                       <a:r>
-                        <a:rPr lang="en" sz="1200" dirty="0">
+                        <a:rPr lang="pt-BR" sz="1200" dirty="0">
                           <a:solidFill>
                             <a:schemeClr val="dk1"/>
                           </a:solidFill>
                         </a:rPr>
-                        <a:t>Item 4</a:t>
+                        <a:t>…</a:t>
                       </a:r>
-                      <a:endParaRPr sz="1200" dirty="0">
-                        <a:solidFill>
+                    </a:p>
+                    <a:p>
+                      <a:endParaRPr lang="en-US" sz="1200" dirty="0"/>
+                    </a:p>
+                  </a:txBody>
+                  <a:tcPr/>
+                </a:tc>
+                <a:tc>
+                  <a:txBody>
+                    <a:bodyPr/>
+                    <a:lstStyle/>
+                    <a:p>
+                      <a:pPr marL="457200" lvl="0" indent="-317500" algn="l" rtl="0">
+                        <a:spcBef>
+                          <a:spcPts val="0"/>
+                        </a:spcBef>
+                        <a:spcAft>
+                          <a:spcPts val="0"/>
+                        </a:spcAft>
+                        <a:buClr>
                           <a:schemeClr val="dk1"/>
-                        </a:solidFill>
-                      </a:endParaRPr>
+                        </a:buClr>
+                        <a:buSzPts val="1400"/>
+                        <a:buChar char="●"/>
+                      </a:pPr>
+                      <a:r>
+                        <a:rPr lang="pt-BR" sz="1200" dirty="0">
+                          <a:solidFill>
+                            <a:schemeClr val="dk1"/>
+                          </a:solidFill>
+                        </a:rPr>
+                        <a:t>Item 1</a:t>
+                      </a:r>
                     </a:p>
                     <a:p>
                       <a:pPr marL="457200" lvl="0" indent="-317500" algn="l" rtl="0">
@@ -6806,16 +6631,16 @@
                         <a:buChar char="●"/>
                       </a:pPr>
                       <a:r>
-                        <a:rPr lang="en" sz="1200" dirty="0">
+                        <a:rPr lang="pt-BR" sz="1200" dirty="0">
                           <a:solidFill>
                             <a:schemeClr val="dk1"/>
                           </a:solidFill>
                         </a:rPr>
-                        <a:t>…</a:t>
+                        <a:t>Item 2</a:t>
                       </a:r>
                     </a:p>
                     <a:p>
-                      <a:pPr marL="139700" lvl="0" indent="0" algn="l" rtl="0">
+                      <a:pPr marL="457200" lvl="0" indent="-317500" algn="l" rtl="0">
                         <a:spcBef>
                           <a:spcPts val="0"/>
                         </a:spcBef>
@@ -6826,16 +6651,19 @@
                           <a:schemeClr val="dk1"/>
                         </a:buClr>
                         <a:buSzPts val="1400"/>
-                        <a:buNone/>
+                        <a:buChar char="●"/>
                       </a:pPr>
-                      <a:endParaRPr lang="en" sz="1200" dirty="0">
-                        <a:solidFill>
-                          <a:schemeClr val="dk1"/>
-                        </a:solidFill>
-                      </a:endParaRPr>
+                      <a:r>
+                        <a:rPr lang="pt-BR" sz="1200" dirty="0">
+                          <a:solidFill>
+                            <a:schemeClr val="dk1"/>
+                          </a:solidFill>
+                        </a:rPr>
+                        <a:t>Item 3</a:t>
+                      </a:r>
                     </a:p>
                     <a:p>
-                      <a:pPr marL="139700" lvl="0" indent="0" algn="l" rtl="0">
+                      <a:pPr marL="457200" lvl="0" indent="-317500" algn="l" rtl="0">
                         <a:spcBef>
                           <a:spcPts val="0"/>
                         </a:spcBef>
@@ -6846,48 +6674,16 @@
                           <a:schemeClr val="dk1"/>
                         </a:buClr>
                         <a:buSzPts val="1400"/>
-                        <a:buNone/>
-                      </a:pPr>
-                      <a:endParaRPr sz="1200" dirty="0">
-                        <a:solidFill>
-                          <a:schemeClr val="dk1"/>
-                        </a:solidFill>
-                      </a:endParaRPr>
-                    </a:p>
-                  </a:txBody>
-                  <a:tcPr marL="91425" marR="91425" marT="91425" marB="91425"/>
-                </a:tc>
-                <a:tc>
-                  <a:txBody>
-                    <a:bodyPr/>
-                    <a:lstStyle/>
-                    <a:p>
-                      <a:pPr marL="0" lvl="0" indent="0" algn="l" rtl="0">
-                        <a:spcBef>
-                          <a:spcPts val="0"/>
-                        </a:spcBef>
-                        <a:spcAft>
-                          <a:spcPts val="0"/>
-                        </a:spcAft>
-                        <a:buNone/>
+                        <a:buChar char="●"/>
                       </a:pPr>
                       <a:r>
-                        <a:rPr lang="en-US" sz="1200" b="1" u="sng" dirty="0"/>
-                        <a:t>New Project Ideas</a:t>
+                        <a:rPr lang="pt-BR" sz="1200" dirty="0">
+                          <a:solidFill>
+                            <a:schemeClr val="dk1"/>
+                          </a:solidFill>
+                        </a:rPr>
+                        <a:t>Item 4</a:t>
                       </a:r>
-                      <a:endParaRPr sz="1200" b="1" u="sng" dirty="0"/>
-                    </a:p>
-                    <a:p>
-                      <a:pPr marL="0" lvl="0" indent="0" algn="l" rtl="0">
-                        <a:spcBef>
-                          <a:spcPts val="0"/>
-                        </a:spcBef>
-                        <a:spcAft>
-                          <a:spcPts val="0"/>
-                        </a:spcAft>
-                        <a:buNone/>
-                      </a:pPr>
-                      <a:endParaRPr sz="1200" b="1" u="sng" dirty="0"/>
                     </a:p>
                     <a:p>
                       <a:pPr marL="457200" lvl="0" indent="-317500" algn="l" rtl="0">
@@ -6897,14 +6693,53 @@
                         <a:spcAft>
                           <a:spcPts val="0"/>
                         </a:spcAft>
+                        <a:buClr>
+                          <a:schemeClr val="dk1"/>
+                        </a:buClr>
                         <a:buSzPts val="1400"/>
                         <a:buChar char="●"/>
                       </a:pPr>
                       <a:r>
-                        <a:rPr lang="en" sz="1200" dirty="0"/>
+                        <a:rPr lang="pt-BR" sz="1200" dirty="0">
+                          <a:solidFill>
+                            <a:schemeClr val="dk1"/>
+                          </a:solidFill>
+                        </a:rPr>
+                        <a:t>…</a:t>
+                      </a:r>
+                    </a:p>
+                    <a:p>
+                      <a:endParaRPr lang="en-US" sz="1200" dirty="0"/>
+                    </a:p>
+                  </a:txBody>
+                  <a:tcPr/>
+                </a:tc>
+                <a:tc>
+                  <a:txBody>
+                    <a:bodyPr/>
+                    <a:lstStyle/>
+                    <a:p>
+                      <a:pPr marL="457200" lvl="0" indent="-317500" algn="l" rtl="0">
+                        <a:spcBef>
+                          <a:spcPts val="0"/>
+                        </a:spcBef>
+                        <a:spcAft>
+                          <a:spcPts val="0"/>
+                        </a:spcAft>
+                        <a:buClr>
+                          <a:schemeClr val="dk1"/>
+                        </a:buClr>
+                        <a:buSzPts val="1400"/>
+                        <a:buChar char="●"/>
+                      </a:pPr>
+                      <a:r>
+                        <a:rPr lang="pt-BR" sz="1200" dirty="0">
+                          <a:solidFill>
+                            <a:schemeClr val="dk1"/>
+                          </a:solidFill>
+                        </a:rPr>
                         <a:t>Item 1</a:t>
                       </a:r>
-                      <a:endParaRPr sz="1200" dirty="0"/>
                     </a:p>
                     <a:p>
                       <a:pPr marL="457200" lvl="0" indent="-317500" algn="l" rtl="0">
@@ -6914,14 +6749,20 @@
                         <a:spcAft>
                           <a:spcPts val="0"/>
                         </a:spcAft>
+                        <a:buClr>
+                          <a:schemeClr val="dk1"/>
+                        </a:buClr>
                         <a:buSzPts val="1400"/>
                         <a:buChar char="●"/>
                       </a:pPr>
                       <a:r>
-                        <a:rPr lang="en" sz="1200" dirty="0"/>
+                        <a:rPr lang="pt-BR" sz="1200" dirty="0">
+                          <a:solidFill>
+                            <a:schemeClr val="dk1"/>
+                          </a:solidFill>
+                        </a:rPr>
                         <a:t>Item 2</a:t>
                       </a:r>
-                      <a:endParaRPr sz="1200" dirty="0"/>
                     </a:p>
                     <a:p>
                       <a:pPr marL="457200" lvl="0" indent="-317500" algn="l" rtl="0">
@@ -6931,14 +6772,20 @@
                         <a:spcAft>
                           <a:spcPts val="0"/>
                         </a:spcAft>
+                        <a:buClr>
+                          <a:schemeClr val="dk1"/>
+                        </a:buClr>
                         <a:buSzPts val="1400"/>
                         <a:buChar char="●"/>
                       </a:pPr>
                       <a:r>
-                        <a:rPr lang="en" sz="1200" dirty="0"/>
+                        <a:rPr lang="pt-BR" sz="1200" dirty="0">
+                          <a:solidFill>
+                            <a:schemeClr val="dk1"/>
+                          </a:solidFill>
+                        </a:rPr>
                         <a:t>Item 3</a:t>
                       </a:r>
-                      <a:endParaRPr sz="1200" dirty="0"/>
                     </a:p>
                     <a:p>
                       <a:pPr marL="457200" lvl="0" indent="-317500" algn="l" rtl="0">
@@ -6948,14 +6795,20 @@
                         <a:spcAft>
                           <a:spcPts val="0"/>
                         </a:spcAft>
+                        <a:buClr>
+                          <a:schemeClr val="dk1"/>
+                        </a:buClr>
                         <a:buSzPts val="1400"/>
                         <a:buChar char="●"/>
                       </a:pPr>
                       <a:r>
-                        <a:rPr lang="en" sz="1200" dirty="0"/>
+                        <a:rPr lang="pt-BR" sz="1200" dirty="0">
+                          <a:solidFill>
+                            <a:schemeClr val="dk1"/>
+                          </a:solidFill>
+                        </a:rPr>
                         <a:t>Item 4</a:t>
                       </a:r>
-                      <a:endParaRPr sz="1200" dirty="0"/>
                     </a:p>
                     <a:p>
                       <a:pPr marL="457200" lvl="0" indent="-317500" algn="l" rtl="0">
@@ -6965,21 +6818,30 @@
                         <a:spcAft>
                           <a:spcPts val="0"/>
                         </a:spcAft>
+                        <a:buClr>
+                          <a:schemeClr val="dk1"/>
+                        </a:buClr>
                         <a:buSzPts val="1400"/>
                         <a:buChar char="●"/>
                       </a:pPr>
                       <a:r>
-                        <a:rPr lang="en" sz="1200" dirty="0"/>
+                        <a:rPr lang="pt-BR" sz="1200" dirty="0">
+                          <a:solidFill>
+                            <a:schemeClr val="dk1"/>
+                          </a:solidFill>
+                        </a:rPr>
                         <a:t>…</a:t>
                       </a:r>
-                      <a:endParaRPr sz="1200" dirty="0"/>
+                    </a:p>
+                    <a:p>
+                      <a:endParaRPr lang="en-US" sz="1200" dirty="0"/>
                     </a:p>
                   </a:txBody>
-                  <a:tcPr marL="91425" marR="91425" marT="91425" marB="91425"/>
+                  <a:tcPr/>
                 </a:tc>
                 <a:extLst>
                   <a:ext uri="{0D108BD9-81ED-4DB2-BD59-A6C34878D82A}">
-                    <a16:rowId xmlns:a16="http://schemas.microsoft.com/office/drawing/2014/main" val="10001"/>
+                    <a16:rowId xmlns:a16="http://schemas.microsoft.com/office/drawing/2014/main" val="2031072817"/>
                   </a:ext>
                 </a:extLst>
               </a:tr>

</xml_diff>